<commit_message>
fix: ogp for twitter
</commit_message>
<xml_diff>
--- a/src/image_works/thumbnail.pptx
+++ b/src/image_works/thumbnail.pptx
@@ -5628,35 +5628,6 @@
           <a:chExt cx="0" cy="0"/>
         </a:xfrm>
       </p:grpSpPr>
-      <p:pic>
-        <p:nvPicPr>
-          <p:cNvPr id="15" name="図 14">
-            <a:extLst>
-              <a:ext uri="{FF2B5EF4-FFF2-40B4-BE49-F238E27FC236}">
-                <a16:creationId xmlns:a16="http://schemas.microsoft.com/office/drawing/2014/main" id="{7784DB49-4E32-0F7C-35F5-66198F8F637C}"/>
-              </a:ext>
-            </a:extLst>
-          </p:cNvPr>
-          <p:cNvPicPr>
-            <a:picLocks noChangeAspect="1"/>
-          </p:cNvPicPr>
-          <p:nvPr/>
-        </p:nvPicPr>
-        <p:blipFill rotWithShape="1">
-          <a:blip r:embed="rId2"/>
-          <a:srcRect l="28" r="1"/>
-          <a:stretch/>
-        </p:blipFill>
-        <p:spPr>
-          <a:xfrm>
-            <a:off x="5321299" y="-9525"/>
-            <a:ext cx="6252243" cy="8221223"/>
-          </a:xfrm>
-          <a:prstGeom prst="rect">
-            <a:avLst/>
-          </a:prstGeom>
-        </p:spPr>
-      </p:pic>
       <p:sp>
         <p:nvSpPr>
           <p:cNvPr id="11" name="正方形/長方形 10">
@@ -5723,7 +5694,7 @@
         </p:nvSpPr>
         <p:spPr>
           <a:xfrm>
-            <a:off x="329639" y="350253"/>
+            <a:off x="329639" y="474362"/>
             <a:ext cx="5280660" cy="1938992"/>
           </a:xfrm>
           <a:prstGeom prst="rect">
@@ -5815,7 +5786,7 @@
         </p:nvSpPr>
         <p:spPr>
           <a:xfrm>
-            <a:off x="413142" y="2854255"/>
+            <a:off x="413142" y="2730146"/>
             <a:ext cx="4646378" cy="1754326"/>
           </a:xfrm>
           <a:prstGeom prst="rect">
@@ -5911,7 +5882,7 @@
         <p:spPr>
           <a:xfrm>
             <a:off x="5280658" y="0"/>
-            <a:ext cx="45719" cy="5143500"/>
+            <a:ext cx="46992" cy="5143500"/>
           </a:xfrm>
           <a:prstGeom prst="rect">
             <a:avLst/>
@@ -5950,208 +5921,6 @@
       </p:sp>
       <p:sp>
         <p:nvSpPr>
-          <p:cNvPr id="21" name="テキスト ボックス 20">
-            <a:extLst>
-              <a:ext uri="{FF2B5EF4-FFF2-40B4-BE49-F238E27FC236}">
-                <a16:creationId xmlns:a16="http://schemas.microsoft.com/office/drawing/2014/main" id="{B39F9F16-F278-1F24-68A5-9A370A3A8EC8}"/>
-              </a:ext>
-            </a:extLst>
-          </p:cNvPr>
-          <p:cNvSpPr txBox="1"/>
-          <p:nvPr/>
-        </p:nvSpPr>
-        <p:spPr>
-          <a:xfrm>
-            <a:off x="6162674" y="2854255"/>
-            <a:ext cx="4781874" cy="2089219"/>
-          </a:xfrm>
-          <a:prstGeom prst="rect">
-            <a:avLst/>
-          </a:prstGeom>
-          <a:solidFill>
-            <a:srgbClr val="354F9B">
-              <a:alpha val="89804"/>
-            </a:srgbClr>
-          </a:solidFill>
-        </p:spPr>
-        <p:txBody>
-          <a:bodyPr wrap="square" tIns="108000" bIns="0" rtlCol="0" anchor="ctr" anchorCtr="0">
-            <a:noAutofit/>
-          </a:bodyPr>
-          <a:lstStyle/>
-          <a:p>
-            <a:pPr marL="390525" indent="-390525">
-              <a:lnSpc>
-                <a:spcPct val="97000"/>
-              </a:lnSpc>
-              <a:spcBef>
-                <a:spcPts val="600"/>
-              </a:spcBef>
-              <a:buClr>
-                <a:schemeClr val="bg1"/>
-              </a:buClr>
-              <a:buFont typeface="Wingdings" panose="05000000000000000000" pitchFamily="2" charset="2"/>
-              <a:buChar char="ü"/>
-            </a:pPr>
-            <a:r>
-              <a:rPr kumimoji="1" lang="ja-JP" altLang="en-US" sz="3000" b="1" dirty="0">
-                <a:solidFill>
-                  <a:srgbClr val="FFFF00"/>
-                </a:solidFill>
-              </a:rPr>
-              <a:t>自宅</a:t>
-            </a:r>
-            <a:r>
-              <a:rPr kumimoji="1" lang="ja-JP" altLang="en-US" sz="2200" b="1" dirty="0">
-                <a:solidFill>
-                  <a:schemeClr val="bg1"/>
-                </a:solidFill>
-              </a:rPr>
-              <a:t>や</a:t>
-            </a:r>
-            <a:r>
-              <a:rPr kumimoji="1" lang="ja-JP" altLang="en-US" sz="3000" b="1" dirty="0">
-                <a:solidFill>
-                  <a:srgbClr val="FFFF00"/>
-                </a:solidFill>
-              </a:rPr>
-              <a:t>職場</a:t>
-            </a:r>
-            <a:r>
-              <a:rPr kumimoji="1" lang="ja-JP" altLang="en-US" sz="2200" b="1" dirty="0">
-                <a:solidFill>
-                  <a:schemeClr val="bg1"/>
-                </a:solidFill>
-              </a:rPr>
-              <a:t>から</a:t>
-            </a:r>
-            <a:br>
-              <a:rPr kumimoji="1" lang="en-US" altLang="ja-JP" sz="3000" b="1" dirty="0">
-                <a:solidFill>
-                  <a:schemeClr val="bg1"/>
-                </a:solidFill>
-              </a:rPr>
-            </a:br>
-            <a:r>
-              <a:rPr kumimoji="1" lang="ja-JP" altLang="en-US" sz="3000" b="1" dirty="0">
-                <a:solidFill>
-                  <a:srgbClr val="FFFF00"/>
-                </a:solidFill>
-              </a:rPr>
-              <a:t>よく</a:t>
-            </a:r>
-            <a:r>
-              <a:rPr kumimoji="1" lang="ja-JP" altLang="en-US" sz="2200" b="1" dirty="0">
-                <a:solidFill>
-                  <a:schemeClr val="bg1"/>
-                </a:solidFill>
-              </a:rPr>
-              <a:t>行く所へ</a:t>
-            </a:r>
-            <a:endParaRPr kumimoji="1" lang="en-US" altLang="ja-JP" sz="2200" b="1" dirty="0">
-              <a:solidFill>
-                <a:schemeClr val="bg1"/>
-              </a:solidFill>
-            </a:endParaRPr>
-          </a:p>
-          <a:p>
-            <a:pPr marL="390525" indent="-390525">
-              <a:lnSpc>
-                <a:spcPct val="97000"/>
-              </a:lnSpc>
-              <a:spcBef>
-                <a:spcPts val="600"/>
-              </a:spcBef>
-              <a:buClr>
-                <a:schemeClr val="bg1"/>
-              </a:buClr>
-              <a:buFont typeface="Wingdings" panose="05000000000000000000" pitchFamily="2" charset="2"/>
-              <a:buChar char="ü"/>
-            </a:pPr>
-            <a:r>
-              <a:rPr kumimoji="1" lang="ja-JP" altLang="en-US" sz="3000" b="1" dirty="0">
-                <a:solidFill>
-                  <a:schemeClr val="bg1"/>
-                </a:solidFill>
-              </a:rPr>
-              <a:t>バス</a:t>
-            </a:r>
-            <a:r>
-              <a:rPr kumimoji="1" lang="en-US" altLang="ja-JP" sz="3000" b="1" dirty="0">
-                <a:solidFill>
-                  <a:srgbClr val="FFFF00"/>
-                </a:solidFill>
-              </a:rPr>
-              <a:t>5</a:t>
-            </a:r>
-            <a:r>
-              <a:rPr kumimoji="1" lang="ja-JP" altLang="en-US" sz="3000" b="1" dirty="0">
-                <a:solidFill>
-                  <a:srgbClr val="FFFF00"/>
-                </a:solidFill>
-              </a:rPr>
-              <a:t>社</a:t>
-            </a:r>
-            <a:r>
-              <a:rPr kumimoji="1" lang="ja-JP" altLang="en-US" sz="2200" b="1" dirty="0">
-                <a:solidFill>
-                  <a:schemeClr val="bg1"/>
-                </a:solidFill>
-              </a:rPr>
-              <a:t>の</a:t>
-            </a:r>
-            <a:br>
-              <a:rPr kumimoji="1" lang="en-US" altLang="ja-JP" sz="3000" b="1" dirty="0">
-                <a:solidFill>
-                  <a:schemeClr val="bg1"/>
-                </a:solidFill>
-              </a:rPr>
-            </a:br>
-            <a:r>
-              <a:rPr kumimoji="1" lang="ja-JP" altLang="en-US" sz="3000" b="1" dirty="0">
-                <a:solidFill>
-                  <a:schemeClr val="bg1"/>
-                </a:solidFill>
-              </a:rPr>
-              <a:t>情報</a:t>
-            </a:r>
-            <a:r>
-              <a:rPr kumimoji="1" lang="ja-JP" altLang="en-US" sz="2200" b="1" dirty="0">
-                <a:solidFill>
-                  <a:schemeClr val="bg1"/>
-                </a:solidFill>
-              </a:rPr>
-              <a:t>を</a:t>
-            </a:r>
-            <a:r>
-              <a:rPr kumimoji="1" lang="en-US" altLang="ja-JP" sz="3000" b="1" dirty="0">
-                <a:solidFill>
-                  <a:srgbClr val="FFFF00"/>
-                </a:solidFill>
-              </a:rPr>
-              <a:t>1</a:t>
-            </a:r>
-            <a:r>
-              <a:rPr kumimoji="1" lang="ja-JP" altLang="en-US" sz="3000" b="1" dirty="0">
-                <a:solidFill>
-                  <a:srgbClr val="FFFF00"/>
-                </a:solidFill>
-              </a:rPr>
-              <a:t>枚</a:t>
-            </a:r>
-            <a:r>
-              <a:rPr kumimoji="1" lang="ja-JP" altLang="en-US" sz="2200" b="1" dirty="0">
-                <a:solidFill>
-                  <a:schemeClr val="bg1"/>
-                </a:solidFill>
-              </a:rPr>
-              <a:t>に</a:t>
-            </a:r>
-          </a:p>
-        </p:txBody>
-      </p:sp>
-      <p:sp>
-        <p:nvSpPr>
           <p:cNvPr id="35" name="正方形/長方形 34">
             <a:extLst>
               <a:ext uri="{FF2B5EF4-FFF2-40B4-BE49-F238E27FC236}">
@@ -6164,7 +5933,7 @@
         </p:nvSpPr>
         <p:spPr>
           <a:xfrm>
-            <a:off x="8391525" y="85725"/>
+            <a:off x="8391525" y="339725"/>
             <a:ext cx="2057400" cy="485775"/>
           </a:xfrm>
           <a:prstGeom prst="rect">
@@ -6216,7 +5985,7 @@
         </p:nvSpPr>
         <p:spPr>
           <a:xfrm>
-            <a:off x="413142" y="4644434"/>
+            <a:off x="413142" y="4520325"/>
             <a:ext cx="4580100" cy="307777"/>
           </a:xfrm>
           <a:prstGeom prst="rect">
@@ -6288,6 +6057,289 @@
               <a:ea typeface="HGPｺﾞｼｯｸM" panose="020B0600000000000000" pitchFamily="50" charset="-128"/>
               <a:sym typeface="Wingdings" panose="05000000000000000000" pitchFamily="2" charset="2"/>
             </a:endParaRPr>
+          </a:p>
+        </p:txBody>
+      </p:sp>
+      <p:pic>
+        <p:nvPicPr>
+          <p:cNvPr id="15" name="図 14">
+            <a:extLst>
+              <a:ext uri="{FF2B5EF4-FFF2-40B4-BE49-F238E27FC236}">
+                <a16:creationId xmlns:a16="http://schemas.microsoft.com/office/drawing/2014/main" id="{7784DB49-4E32-0F7C-35F5-66198F8F637C}"/>
+              </a:ext>
+            </a:extLst>
+          </p:cNvPr>
+          <p:cNvPicPr>
+            <a:picLocks noChangeAspect="1"/>
+          </p:cNvPicPr>
+          <p:nvPr/>
+        </p:nvPicPr>
+        <p:blipFill rotWithShape="1">
+          <a:blip r:embed="rId2"/>
+          <a:srcRect l="-175" r="1"/>
+          <a:stretch/>
+        </p:blipFill>
+        <p:spPr>
+          <a:xfrm>
+            <a:off x="5308599" y="244475"/>
+            <a:ext cx="6264943" cy="8221223"/>
+          </a:xfrm>
+          <a:prstGeom prst="rect">
+            <a:avLst/>
+          </a:prstGeom>
+        </p:spPr>
+      </p:pic>
+      <p:sp>
+        <p:nvSpPr>
+          <p:cNvPr id="21" name="テキスト ボックス 20">
+            <a:extLst>
+              <a:ext uri="{FF2B5EF4-FFF2-40B4-BE49-F238E27FC236}">
+                <a16:creationId xmlns:a16="http://schemas.microsoft.com/office/drawing/2014/main" id="{B39F9F16-F278-1F24-68A5-9A370A3A8EC8}"/>
+              </a:ext>
+            </a:extLst>
+          </p:cNvPr>
+          <p:cNvSpPr txBox="1"/>
+          <p:nvPr/>
+        </p:nvSpPr>
+        <p:spPr>
+          <a:xfrm>
+            <a:off x="6162674" y="2584994"/>
+            <a:ext cx="4781874" cy="2089219"/>
+          </a:xfrm>
+          <a:prstGeom prst="rect">
+            <a:avLst/>
+          </a:prstGeom>
+          <a:solidFill>
+            <a:srgbClr val="354F9B">
+              <a:alpha val="89804"/>
+            </a:srgbClr>
+          </a:solidFill>
+        </p:spPr>
+        <p:txBody>
+          <a:bodyPr wrap="square" tIns="108000" bIns="0" rtlCol="0" anchor="ctr" anchorCtr="0">
+            <a:noAutofit/>
+          </a:bodyPr>
+          <a:lstStyle/>
+          <a:p>
+            <a:pPr marL="390525" indent="-390525">
+              <a:lnSpc>
+                <a:spcPct val="97000"/>
+              </a:lnSpc>
+              <a:spcBef>
+                <a:spcPts val="600"/>
+              </a:spcBef>
+              <a:buClr>
+                <a:schemeClr val="bg1"/>
+              </a:buClr>
+              <a:buFont typeface="Wingdings" panose="05000000000000000000" pitchFamily="2" charset="2"/>
+              <a:buChar char="ü"/>
+            </a:pPr>
+            <a:r>
+              <a:rPr kumimoji="1" lang="ja-JP" altLang="en-US" sz="3000" b="1" dirty="0">
+                <a:solidFill>
+                  <a:srgbClr val="FFFF00"/>
+                </a:solidFill>
+              </a:rPr>
+              <a:t>自宅</a:t>
+            </a:r>
+            <a:r>
+              <a:rPr kumimoji="1" lang="ja-JP" altLang="en-US" sz="2200" b="1" dirty="0">
+                <a:solidFill>
+                  <a:schemeClr val="bg1"/>
+                </a:solidFill>
+              </a:rPr>
+              <a:t>や</a:t>
+            </a:r>
+            <a:r>
+              <a:rPr kumimoji="1" lang="ja-JP" altLang="en-US" sz="3000" b="1" dirty="0">
+                <a:solidFill>
+                  <a:srgbClr val="FFFF00"/>
+                </a:solidFill>
+              </a:rPr>
+              <a:t>職場</a:t>
+            </a:r>
+            <a:r>
+              <a:rPr kumimoji="1" lang="ja-JP" altLang="en-US" sz="2200" b="1" dirty="0">
+                <a:solidFill>
+                  <a:schemeClr val="bg1"/>
+                </a:solidFill>
+              </a:rPr>
+              <a:t>から</a:t>
+            </a:r>
+            <a:br>
+              <a:rPr kumimoji="1" lang="en-US" altLang="ja-JP" sz="3000" b="1" dirty="0">
+                <a:solidFill>
+                  <a:schemeClr val="bg1"/>
+                </a:solidFill>
+              </a:rPr>
+            </a:br>
+            <a:r>
+              <a:rPr kumimoji="1" lang="ja-JP" altLang="en-US" sz="3000" b="1" dirty="0">
+                <a:solidFill>
+                  <a:srgbClr val="FFFF00"/>
+                </a:solidFill>
+              </a:rPr>
+              <a:t>よく</a:t>
+            </a:r>
+            <a:r>
+              <a:rPr kumimoji="1" lang="ja-JP" altLang="en-US" sz="2200" b="1" dirty="0">
+                <a:solidFill>
+                  <a:schemeClr val="bg1"/>
+                </a:solidFill>
+              </a:rPr>
+              <a:t>行く所へ</a:t>
+            </a:r>
+            <a:endParaRPr kumimoji="1" lang="en-US" altLang="ja-JP" sz="2200" b="1" dirty="0">
+              <a:solidFill>
+                <a:schemeClr val="bg1"/>
+              </a:solidFill>
+            </a:endParaRPr>
+          </a:p>
+          <a:p>
+            <a:pPr marL="390525" indent="-390525">
+              <a:lnSpc>
+                <a:spcPct val="97000"/>
+              </a:lnSpc>
+              <a:spcBef>
+                <a:spcPts val="600"/>
+              </a:spcBef>
+              <a:buClr>
+                <a:schemeClr val="bg1"/>
+              </a:buClr>
+              <a:buFont typeface="Wingdings" panose="05000000000000000000" pitchFamily="2" charset="2"/>
+              <a:buChar char="ü"/>
+            </a:pPr>
+            <a:r>
+              <a:rPr kumimoji="1" lang="ja-JP" altLang="en-US" sz="3000" b="1" dirty="0">
+                <a:solidFill>
+                  <a:schemeClr val="bg1"/>
+                </a:solidFill>
+              </a:rPr>
+              <a:t>バス</a:t>
+            </a:r>
+            <a:r>
+              <a:rPr kumimoji="1" lang="en-US" altLang="ja-JP" sz="3000" b="1" dirty="0">
+                <a:solidFill>
+                  <a:srgbClr val="FFFF00"/>
+                </a:solidFill>
+              </a:rPr>
+              <a:t>5</a:t>
+            </a:r>
+            <a:r>
+              <a:rPr kumimoji="1" lang="ja-JP" altLang="en-US" sz="3000" b="1" dirty="0">
+                <a:solidFill>
+                  <a:srgbClr val="FFFF00"/>
+                </a:solidFill>
+              </a:rPr>
+              <a:t>社</a:t>
+            </a:r>
+            <a:r>
+              <a:rPr kumimoji="1" lang="ja-JP" altLang="en-US" sz="2200" b="1" dirty="0">
+                <a:solidFill>
+                  <a:schemeClr val="bg1"/>
+                </a:solidFill>
+              </a:rPr>
+              <a:t>の</a:t>
+            </a:r>
+            <a:br>
+              <a:rPr kumimoji="1" lang="en-US" altLang="ja-JP" sz="3000" b="1" dirty="0">
+                <a:solidFill>
+                  <a:schemeClr val="bg1"/>
+                </a:solidFill>
+              </a:rPr>
+            </a:br>
+            <a:r>
+              <a:rPr kumimoji="1" lang="ja-JP" altLang="en-US" sz="3000" b="1" dirty="0">
+                <a:solidFill>
+                  <a:schemeClr val="bg1"/>
+                </a:solidFill>
+              </a:rPr>
+              <a:t>情報</a:t>
+            </a:r>
+            <a:r>
+              <a:rPr kumimoji="1" lang="ja-JP" altLang="en-US" sz="2200" b="1" dirty="0">
+                <a:solidFill>
+                  <a:schemeClr val="bg1"/>
+                </a:solidFill>
+              </a:rPr>
+              <a:t>を</a:t>
+            </a:r>
+            <a:r>
+              <a:rPr kumimoji="1" lang="en-US" altLang="ja-JP" sz="3000" b="1" dirty="0">
+                <a:solidFill>
+                  <a:srgbClr val="FFFF00"/>
+                </a:solidFill>
+              </a:rPr>
+              <a:t>1</a:t>
+            </a:r>
+            <a:r>
+              <a:rPr kumimoji="1" lang="ja-JP" altLang="en-US" sz="3000" b="1" dirty="0">
+                <a:solidFill>
+                  <a:srgbClr val="FFFF00"/>
+                </a:solidFill>
+              </a:rPr>
+              <a:t>枚</a:t>
+            </a:r>
+            <a:r>
+              <a:rPr kumimoji="1" lang="ja-JP" altLang="en-US" sz="2200" b="1" dirty="0">
+                <a:solidFill>
+                  <a:schemeClr val="bg1"/>
+                </a:solidFill>
+              </a:rPr>
+              <a:t>に</a:t>
+            </a:r>
+          </a:p>
+        </p:txBody>
+      </p:sp>
+      <p:sp>
+        <p:nvSpPr>
+          <p:cNvPr id="3" name="正方形/長方形 2">
+            <a:extLst>
+              <a:ext uri="{FF2B5EF4-FFF2-40B4-BE49-F238E27FC236}">
+                <a16:creationId xmlns:a16="http://schemas.microsoft.com/office/drawing/2014/main" id="{4B8C9F0D-0FE5-A11A-2C26-317B990D6000}"/>
+              </a:ext>
+            </a:extLst>
+          </p:cNvPr>
+          <p:cNvSpPr/>
+          <p:nvPr/>
+        </p:nvSpPr>
+        <p:spPr>
+          <a:xfrm>
+            <a:off x="5321299" y="-76200"/>
+            <a:ext cx="4585938" cy="355600"/>
+          </a:xfrm>
+          <a:prstGeom prst="rect">
+            <a:avLst/>
+          </a:prstGeom>
+          <a:solidFill>
+            <a:srgbClr val="354F9B"/>
+          </a:solidFill>
+          <a:ln>
+            <a:noFill/>
+          </a:ln>
+        </p:spPr>
+        <p:style>
+          <a:lnRef idx="2">
+            <a:schemeClr val="accent1">
+              <a:shade val="15000"/>
+            </a:schemeClr>
+          </a:lnRef>
+          <a:fillRef idx="1">
+            <a:schemeClr val="accent1"/>
+          </a:fillRef>
+          <a:effectRef idx="0">
+            <a:schemeClr val="accent1"/>
+          </a:effectRef>
+          <a:fontRef idx="minor">
+            <a:schemeClr val="lt1"/>
+          </a:fontRef>
+        </p:style>
+        <p:txBody>
+          <a:bodyPr rtlCol="0" anchor="ctr"/>
+          <a:lstStyle/>
+          <a:p>
+            <a:pPr algn="ctr"/>
+            <a:endParaRPr kumimoji="1" lang="ja-JP" altLang="en-US"/>
           </a:p>
         </p:txBody>
       </p:sp>

</xml_diff>